<commit_message>
Code refactor. Removed a empty row or an unused method field here and there. Bug fixes (int to boolean). Added small changes to presentation, DB creation request, DB contents qol improvements, etc.
</commit_message>
<xml_diff>
--- a/eMAG.pptx
+++ b/eMAG.pptx
@@ -2,7 +2,7 @@
 <file path=ppt/presentation.xml><?xml version="1.0" encoding="utf-8"?>
 <p:presentation xmlns:a="http://schemas.openxmlformats.org/drawingml/2006/main" xmlns:r="http://schemas.openxmlformats.org/officeDocument/2006/relationships" xmlns:p="http://schemas.openxmlformats.org/presentationml/2006/main" saveSubsetFonts="1">
   <p:sldMasterIdLst>
-    <p:sldMasterId id="2147483750" r:id="rId1"/>
+    <p:sldMasterId id="2147483786" r:id="rId1"/>
   </p:sldMasterIdLst>
   <p:sldIdLst>
     <p:sldId id="256" r:id="rId2"/>
@@ -371,7 +371,7 @@
     </p:spTree>
     <p:extLst>
       <p:ext uri="{BB962C8B-B14F-4D97-AF65-F5344CB8AC3E}">
-        <p14:creationId xmlns:p14="http://schemas.microsoft.com/office/powerpoint/2010/main" val="2858049515"/>
+        <p14:creationId xmlns:p14="http://schemas.microsoft.com/office/powerpoint/2010/main" val="2204125156"/>
       </p:ext>
     </p:extLst>
   </p:cSld>
@@ -646,7 +646,7 @@
     </p:spTree>
     <p:extLst>
       <p:ext uri="{BB962C8B-B14F-4D97-AF65-F5344CB8AC3E}">
-        <p14:creationId xmlns:p14="http://schemas.microsoft.com/office/powerpoint/2010/main" val="475628894"/>
+        <p14:creationId xmlns:p14="http://schemas.microsoft.com/office/powerpoint/2010/main" val="99136219"/>
       </p:ext>
     </p:extLst>
   </p:cSld>
@@ -840,7 +840,7 @@
     </p:spTree>
     <p:extLst>
       <p:ext uri="{BB962C8B-B14F-4D97-AF65-F5344CB8AC3E}">
-        <p14:creationId xmlns:p14="http://schemas.microsoft.com/office/powerpoint/2010/main" val="2859732544"/>
+        <p14:creationId xmlns:p14="http://schemas.microsoft.com/office/powerpoint/2010/main" val="1916306346"/>
       </p:ext>
     </p:extLst>
   </p:cSld>
@@ -1191,7 +1191,7 @@
     </p:spTree>
     <p:extLst>
       <p:ext uri="{BB962C8B-B14F-4D97-AF65-F5344CB8AC3E}">
-        <p14:creationId xmlns:p14="http://schemas.microsoft.com/office/powerpoint/2010/main" val="2979555061"/>
+        <p14:creationId xmlns:p14="http://schemas.microsoft.com/office/powerpoint/2010/main" val="2057348765"/>
       </p:ext>
     </p:extLst>
   </p:cSld>
@@ -1438,7 +1438,7 @@
     </p:spTree>
     <p:extLst>
       <p:ext uri="{BB962C8B-B14F-4D97-AF65-F5344CB8AC3E}">
-        <p14:creationId xmlns:p14="http://schemas.microsoft.com/office/powerpoint/2010/main" val="1330892417"/>
+        <p14:creationId xmlns:p14="http://schemas.microsoft.com/office/powerpoint/2010/main" val="3855796947"/>
       </p:ext>
     </p:extLst>
   </p:cSld>
@@ -2057,7 +2057,7 @@
     </p:spTree>
     <p:extLst>
       <p:ext uri="{BB962C8B-B14F-4D97-AF65-F5344CB8AC3E}">
-        <p14:creationId xmlns:p14="http://schemas.microsoft.com/office/powerpoint/2010/main" val="2286415782"/>
+        <p14:creationId xmlns:p14="http://schemas.microsoft.com/office/powerpoint/2010/main" val="3969423540"/>
       </p:ext>
     </p:extLst>
   </p:cSld>
@@ -2904,7 +2904,7 @@
     </p:spTree>
     <p:extLst>
       <p:ext uri="{BB962C8B-B14F-4D97-AF65-F5344CB8AC3E}">
-        <p14:creationId xmlns:p14="http://schemas.microsoft.com/office/powerpoint/2010/main" val="2332524460"/>
+        <p14:creationId xmlns:p14="http://schemas.microsoft.com/office/powerpoint/2010/main" val="1967231206"/>
       </p:ext>
     </p:extLst>
   </p:cSld>
@@ -3074,7 +3074,7 @@
     </p:spTree>
     <p:extLst>
       <p:ext uri="{BB962C8B-B14F-4D97-AF65-F5344CB8AC3E}">
-        <p14:creationId xmlns:p14="http://schemas.microsoft.com/office/powerpoint/2010/main" val="4244870820"/>
+        <p14:creationId xmlns:p14="http://schemas.microsoft.com/office/powerpoint/2010/main" val="4095169814"/>
       </p:ext>
     </p:extLst>
   </p:cSld>
@@ -3254,7 +3254,7 @@
     </p:spTree>
     <p:extLst>
       <p:ext uri="{BB962C8B-B14F-4D97-AF65-F5344CB8AC3E}">
-        <p14:creationId xmlns:p14="http://schemas.microsoft.com/office/powerpoint/2010/main" val="1783208498"/>
+        <p14:creationId xmlns:p14="http://schemas.microsoft.com/office/powerpoint/2010/main" val="1768147559"/>
       </p:ext>
     </p:extLst>
   </p:cSld>
@@ -3424,7 +3424,7 @@
     </p:spTree>
     <p:extLst>
       <p:ext uri="{BB962C8B-B14F-4D97-AF65-F5344CB8AC3E}">
-        <p14:creationId xmlns:p14="http://schemas.microsoft.com/office/powerpoint/2010/main" val="2106723508"/>
+        <p14:creationId xmlns:p14="http://schemas.microsoft.com/office/powerpoint/2010/main" val="2002161849"/>
       </p:ext>
     </p:extLst>
   </p:cSld>
@@ -3671,7 +3671,7 @@
     </p:spTree>
     <p:extLst>
       <p:ext uri="{BB962C8B-B14F-4D97-AF65-F5344CB8AC3E}">
-        <p14:creationId xmlns:p14="http://schemas.microsoft.com/office/powerpoint/2010/main" val="1039874439"/>
+        <p14:creationId xmlns:p14="http://schemas.microsoft.com/office/powerpoint/2010/main" val="2760625425"/>
       </p:ext>
     </p:extLst>
   </p:cSld>
@@ -3963,7 +3963,7 @@
     </p:spTree>
     <p:extLst>
       <p:ext uri="{BB962C8B-B14F-4D97-AF65-F5344CB8AC3E}">
-        <p14:creationId xmlns:p14="http://schemas.microsoft.com/office/powerpoint/2010/main" val="2743886651"/>
+        <p14:creationId xmlns:p14="http://schemas.microsoft.com/office/powerpoint/2010/main" val="1715471707"/>
       </p:ext>
     </p:extLst>
   </p:cSld>
@@ -4407,7 +4407,7 @@
     </p:spTree>
     <p:extLst>
       <p:ext uri="{BB962C8B-B14F-4D97-AF65-F5344CB8AC3E}">
-        <p14:creationId xmlns:p14="http://schemas.microsoft.com/office/powerpoint/2010/main" val="723391831"/>
+        <p14:creationId xmlns:p14="http://schemas.microsoft.com/office/powerpoint/2010/main" val="3650902166"/>
       </p:ext>
     </p:extLst>
   </p:cSld>
@@ -4525,7 +4525,7 @@
     </p:spTree>
     <p:extLst>
       <p:ext uri="{BB962C8B-B14F-4D97-AF65-F5344CB8AC3E}">
-        <p14:creationId xmlns:p14="http://schemas.microsoft.com/office/powerpoint/2010/main" val="1331885895"/>
+        <p14:creationId xmlns:p14="http://schemas.microsoft.com/office/powerpoint/2010/main" val="2687458633"/>
       </p:ext>
     </p:extLst>
   </p:cSld>
@@ -4620,7 +4620,7 @@
     </p:spTree>
     <p:extLst>
       <p:ext uri="{BB962C8B-B14F-4D97-AF65-F5344CB8AC3E}">
-        <p14:creationId xmlns:p14="http://schemas.microsoft.com/office/powerpoint/2010/main" val="1799245623"/>
+        <p14:creationId xmlns:p14="http://schemas.microsoft.com/office/powerpoint/2010/main" val="345850736"/>
       </p:ext>
     </p:extLst>
   </p:cSld>
@@ -4899,7 +4899,7 @@
     </p:spTree>
     <p:extLst>
       <p:ext uri="{BB962C8B-B14F-4D97-AF65-F5344CB8AC3E}">
-        <p14:creationId xmlns:p14="http://schemas.microsoft.com/office/powerpoint/2010/main" val="912781195"/>
+        <p14:creationId xmlns:p14="http://schemas.microsoft.com/office/powerpoint/2010/main" val="2995831205"/>
       </p:ext>
     </p:extLst>
   </p:cSld>
@@ -5174,7 +5174,7 @@
     </p:spTree>
     <p:extLst>
       <p:ext uri="{BB962C8B-B14F-4D97-AF65-F5344CB8AC3E}">
-        <p14:creationId xmlns:p14="http://schemas.microsoft.com/office/powerpoint/2010/main" val="2082891315"/>
+        <p14:creationId xmlns:p14="http://schemas.microsoft.com/office/powerpoint/2010/main" val="324876710"/>
       </p:ext>
     </p:extLst>
   </p:cSld>
@@ -5633,10 +5633,10 @@
       </p:sp>
       <p:pic>
         <p:nvPicPr>
-          <p:cNvPr id="12" name="Picture 11">
+          <p:cNvPr id="11" name="Picture 10">
             <a:extLst>
               <a:ext uri="{FF2B5EF4-FFF2-40B4-BE49-F238E27FC236}">
-                <a16:creationId xmlns:a16="http://schemas.microsoft.com/office/drawing/2014/main" id="{2A4F8002-4068-B709-F15F-035FC6F07088}"/>
+                <a16:creationId xmlns:a16="http://schemas.microsoft.com/office/drawing/2014/main" id="{D36478AB-2E69-44A1-41E3-E1ACC12D315D}"/>
               </a:ext>
             </a:extLst>
           </p:cNvPr>
@@ -5670,29 +5670,29 @@
     </p:spTree>
     <p:extLst>
       <p:ext uri="{BB962C8B-B14F-4D97-AF65-F5344CB8AC3E}">
-        <p14:creationId xmlns:p14="http://schemas.microsoft.com/office/powerpoint/2010/main" val="2402711677"/>
+        <p14:creationId xmlns:p14="http://schemas.microsoft.com/office/powerpoint/2010/main" val="2805019439"/>
       </p:ext>
     </p:extLst>
   </p:cSld>
   <p:clrMap bg1="dk1" tx1="lt1" bg2="dk2" tx2="lt2" accent1="accent1" accent2="accent2" accent3="accent3" accent4="accent4" accent5="accent5" accent6="accent6" hlink="hlink" folHlink="folHlink"/>
   <p:sldLayoutIdLst>
-    <p:sldLayoutId id="2147483751" r:id="rId1"/>
-    <p:sldLayoutId id="2147483752" r:id="rId2"/>
-    <p:sldLayoutId id="2147483753" r:id="rId3"/>
-    <p:sldLayoutId id="2147483754" r:id="rId4"/>
-    <p:sldLayoutId id="2147483755" r:id="rId5"/>
-    <p:sldLayoutId id="2147483756" r:id="rId6"/>
-    <p:sldLayoutId id="2147483757" r:id="rId7"/>
-    <p:sldLayoutId id="2147483758" r:id="rId8"/>
-    <p:sldLayoutId id="2147483759" r:id="rId9"/>
-    <p:sldLayoutId id="2147483760" r:id="rId10"/>
-    <p:sldLayoutId id="2147483761" r:id="rId11"/>
-    <p:sldLayoutId id="2147483762" r:id="rId12"/>
-    <p:sldLayoutId id="2147483763" r:id="rId13"/>
-    <p:sldLayoutId id="2147483764" r:id="rId14"/>
-    <p:sldLayoutId id="2147483765" r:id="rId15"/>
-    <p:sldLayoutId id="2147483766" r:id="rId16"/>
-    <p:sldLayoutId id="2147483767" r:id="rId17"/>
+    <p:sldLayoutId id="2147483787" r:id="rId1"/>
+    <p:sldLayoutId id="2147483788" r:id="rId2"/>
+    <p:sldLayoutId id="2147483789" r:id="rId3"/>
+    <p:sldLayoutId id="2147483790" r:id="rId4"/>
+    <p:sldLayoutId id="2147483791" r:id="rId5"/>
+    <p:sldLayoutId id="2147483792" r:id="rId6"/>
+    <p:sldLayoutId id="2147483793" r:id="rId7"/>
+    <p:sldLayoutId id="2147483794" r:id="rId8"/>
+    <p:sldLayoutId id="2147483795" r:id="rId9"/>
+    <p:sldLayoutId id="2147483796" r:id="rId10"/>
+    <p:sldLayoutId id="2147483797" r:id="rId11"/>
+    <p:sldLayoutId id="2147483798" r:id="rId12"/>
+    <p:sldLayoutId id="2147483799" r:id="rId13"/>
+    <p:sldLayoutId id="2147483800" r:id="rId14"/>
+    <p:sldLayoutId id="2147483801" r:id="rId15"/>
+    <p:sldLayoutId id="2147483802" r:id="rId16"/>
+    <p:sldLayoutId id="2147483803" r:id="rId17"/>
   </p:sldLayoutIdLst>
   <p:txStyles>
     <p:titleStyle>
@@ -6155,7 +6155,12 @@
             <p:ph type="subTitle" idx="1"/>
           </p:nvPr>
         </p:nvSpPr>
-        <p:spPr/>
+        <p:spPr>
+          <a:xfrm>
+            <a:off x="1154955" y="4777380"/>
+            <a:ext cx="9882090" cy="1299570"/>
+          </a:xfrm>
+        </p:spPr>
         <p:txBody>
           <a:bodyPr>
             <a:normAutofit/>
@@ -6164,50 +6169,125 @@
           <a:p>
             <a:pPr algn="r"/>
             <a:r>
-              <a:rPr lang="en-US" dirty="0"/>
-              <a:t>SOTIR DONKOV	</a:t>
-            </a:r>
-            <a:r>
-              <a:rPr lang="bg-BG" dirty="0"/>
+              <a:rPr lang="en-US" dirty="0">
+                <a:solidFill>
+                  <a:schemeClr val="tx1"/>
+                </a:solidFill>
+              </a:rPr>
+              <a:t>	</a:t>
+            </a:r>
+            <a:r>
+              <a:rPr lang="bg-BG" dirty="0">
+                <a:solidFill>
+                  <a:schemeClr val="tx1"/>
+                </a:solidFill>
+              </a:rPr>
               <a:t>									</a:t>
             </a:r>
             <a:r>
-              <a:rPr lang="en-US" dirty="0"/>
+              <a:rPr lang="en-US" dirty="0">
+                <a:solidFill>
+                  <a:schemeClr val="tx1"/>
+                </a:solidFill>
+              </a:rPr>
               <a:t>Stefan </a:t>
             </a:r>
             <a:r>
-              <a:rPr lang="en-US" dirty="0" err="1"/>
+              <a:rPr lang="en-US" dirty="0" err="1">
+                <a:solidFill>
+                  <a:schemeClr val="tx1"/>
+                </a:solidFill>
+              </a:rPr>
               <a:t>Stefanov</a:t>
             </a:r>
-            <a:endParaRPr lang="en-US" dirty="0"/>
+            <a:endParaRPr lang="en-US" dirty="0">
+              <a:solidFill>
+                <a:schemeClr val="tx1"/>
+              </a:solidFill>
+            </a:endParaRPr>
           </a:p>
           <a:p>
             <a:pPr algn="r"/>
             <a:r>
-              <a:rPr lang="en-US" sz="1400" dirty="0"/>
-              <a:t>A final assignment in </a:t>
-            </a:r>
-            <a:r>
-              <a:rPr lang="en-US" sz="1400" dirty="0" err="1"/>
-              <a:t>ITTalents</a:t>
-            </a:r>
-            <a:r>
-              <a:rPr lang="en-US" sz="1400" dirty="0"/>
-              <a:t> Season_14 tutored by </a:t>
-            </a:r>
-            <a:r>
-              <a:rPr lang="en-US" sz="1400" dirty="0" err="1"/>
+              <a:rPr lang="en-US" dirty="0">
+                <a:solidFill>
+                  <a:schemeClr val="tx1"/>
+                </a:solidFill>
+              </a:rPr>
+              <a:t>SOTIR DONKOV</a:t>
+            </a:r>
+          </a:p>
+          <a:p>
+            <a:pPr algn="r"/>
+            <a:r>
+              <a:rPr lang="en-US" sz="1100" dirty="0">
+                <a:solidFill>
+                  <a:schemeClr val="tx1"/>
+                </a:solidFill>
+              </a:rPr>
+              <a:t>A final assignment in</a:t>
+            </a:r>
+            <a:r>
+              <a:rPr lang="en-US" sz="1400" dirty="0">
+                <a:solidFill>
+                  <a:schemeClr val="tx1"/>
+                </a:solidFill>
+              </a:rPr>
+              <a:t> </a:t>
+            </a:r>
+            <a:r>
+              <a:rPr lang="en-US" sz="1400" dirty="0" err="1">
+                <a:solidFill>
+                  <a:schemeClr val="tx1"/>
+                </a:solidFill>
+              </a:rPr>
+              <a:t>ItTalents</a:t>
+            </a:r>
+            <a:r>
+              <a:rPr lang="en-US" sz="1400" dirty="0">
+                <a:solidFill>
+                  <a:schemeClr val="tx1"/>
+                </a:solidFill>
+              </a:rPr>
+              <a:t> Season_14 </a:t>
+            </a:r>
+            <a:r>
+              <a:rPr lang="en-US" sz="1100" dirty="0">
+                <a:solidFill>
+                  <a:schemeClr val="tx1"/>
+                </a:solidFill>
+              </a:rPr>
+              <a:t>tutored by </a:t>
+            </a:r>
+            <a:r>
+              <a:rPr lang="en-US" sz="1400" dirty="0" err="1">
+                <a:solidFill>
+                  <a:schemeClr val="tx1"/>
+                </a:solidFill>
+              </a:rPr>
               <a:t>Krasimir</a:t>
             </a:r>
             <a:r>
-              <a:rPr lang="en-US" sz="1400" dirty="0"/>
+              <a:rPr lang="en-US" sz="1400" dirty="0">
+                <a:solidFill>
+                  <a:schemeClr val="tx1"/>
+                </a:solidFill>
+              </a:rPr>
               <a:t> </a:t>
             </a:r>
             <a:r>
-              <a:rPr lang="en-US" sz="1400" dirty="0" err="1"/>
+              <a:rPr lang="en-US" sz="1400" dirty="0" err="1">
+                <a:solidFill>
+                  <a:schemeClr val="tx1"/>
+                </a:solidFill>
+              </a:rPr>
               <a:t>Stoev</a:t>
             </a:r>
-            <a:endParaRPr lang="bg-BG" sz="1400" dirty="0"/>
+            <a:endParaRPr lang="bg-BG" sz="1400" dirty="0">
+              <a:solidFill>
+                <a:schemeClr val="tx1"/>
+              </a:solidFill>
+            </a:endParaRPr>
           </a:p>
         </p:txBody>
       </p:sp>
@@ -7266,7 +7346,7 @@
         <p:spPr/>
         <p:txBody>
           <a:bodyPr>
-            <a:normAutofit fontScale="92500"/>
+            <a:normAutofit/>
           </a:bodyPr>
           <a:lstStyle/>
           <a:p>
@@ -7556,7 +7636,7 @@
         <p:spPr/>
         <p:txBody>
           <a:bodyPr>
-            <a:normAutofit fontScale="92500"/>
+            <a:normAutofit/>
           </a:bodyPr>
           <a:lstStyle/>
           <a:p>
@@ -7574,7 +7654,11 @@
               <a:buChar char=""/>
             </a:pPr>
             <a:r>
-              <a:rPr lang="en-US" dirty="0"/>
+              <a:rPr lang="en-US" dirty="0">
+                <a:solidFill>
+                  <a:schemeClr val="tx2"/>
+                </a:solidFill>
+              </a:rPr>
               <a:t>Category self-relation</a:t>
             </a:r>
           </a:p>
@@ -7593,7 +7677,7 @@
               <a:buChar char=""/>
             </a:pPr>
             <a:r>
-              <a:rPr lang="en-US" sz="1800" dirty="0">
+              <a:rPr lang="en-US" dirty="0">
                 <a:solidFill>
                   <a:schemeClr val="tx2"/>
                 </a:solidFill>
@@ -7615,7 +7699,7 @@
               <a:buFont typeface="Wingdings" panose="05000000000000000000" pitchFamily="2" charset="2"/>
               <a:buChar char=""/>
             </a:pPr>
-            <a:endParaRPr lang="en-US" sz="1800" dirty="0">
+            <a:endParaRPr lang="en-US" dirty="0">
               <a:solidFill>
                 <a:schemeClr val="tx2"/>
               </a:solidFill>
@@ -7636,7 +7720,7 @@
               <a:buChar char=""/>
             </a:pPr>
             <a:r>
-              <a:rPr lang="en-US" sz="1800" dirty="0">
+              <a:rPr lang="en-US" dirty="0">
                 <a:solidFill>
                   <a:schemeClr val="tx2"/>
                 </a:solidFill>
@@ -7658,7 +7742,7 @@
               <a:buFont typeface="Wingdings" panose="05000000000000000000" pitchFamily="2" charset="2"/>
               <a:buChar char=""/>
             </a:pPr>
-            <a:endParaRPr lang="en-US" sz="1800" dirty="0">
+            <a:endParaRPr lang="en-US" dirty="0">
               <a:solidFill>
                 <a:schemeClr val="tx2"/>
               </a:solidFill>
@@ -7679,18 +7763,13 @@
               <a:buChar char=""/>
             </a:pPr>
             <a:r>
-              <a:rPr lang="en-US">
+              <a:rPr lang="en-US" dirty="0">
                 <a:solidFill>
                   <a:schemeClr val="tx2"/>
                 </a:solidFill>
               </a:rPr>
               <a:t>Done</a:t>
             </a:r>
-            <a:endParaRPr lang="en-US" dirty="0">
-              <a:solidFill>
-                <a:schemeClr val="tx2"/>
-              </a:solidFill>
-            </a:endParaRPr>
           </a:p>
           <a:p>
             <a:pPr>
@@ -7707,7 +7786,7 @@
               <a:buChar char=""/>
             </a:pPr>
             <a:r>
-              <a:rPr lang="en-US" sz="1800" dirty="0">
+              <a:rPr lang="en-US" dirty="0">
                 <a:solidFill>
                   <a:schemeClr val="tx2"/>
                 </a:solidFill>
@@ -7730,7 +7809,11 @@
               <a:buChar char=""/>
             </a:pPr>
             <a:r>
-              <a:rPr lang="en-US" dirty="0"/>
+              <a:rPr lang="en-US" dirty="0">
+                <a:solidFill>
+                  <a:schemeClr val="tx2"/>
+                </a:solidFill>
+              </a:rPr>
               <a:t>Done</a:t>
             </a:r>
           </a:p>
@@ -7749,10 +7832,18 @@
               <a:buChar char=""/>
             </a:pPr>
             <a:r>
-              <a:rPr lang="en-US" dirty="0"/>
+              <a:rPr lang="en-US" dirty="0">
+                <a:solidFill>
+                  <a:schemeClr val="tx2"/>
+                </a:solidFill>
+              </a:rPr>
               <a:t>Done</a:t>
             </a:r>
-            <a:endParaRPr lang="bg-BG" dirty="0"/>
+            <a:endParaRPr lang="bg-BG" dirty="0">
+              <a:solidFill>
+                <a:schemeClr val="tx2"/>
+              </a:solidFill>
+            </a:endParaRPr>
           </a:p>
         </p:txBody>
       </p:sp>
@@ -7815,6 +7906,42 @@
           </a:p>
         </p:txBody>
       </p:sp>
+      <p:pic>
+        <p:nvPicPr>
+          <p:cNvPr id="96" name="Picture Placeholder 95">
+            <a:extLst>
+              <a:ext uri="{FF2B5EF4-FFF2-40B4-BE49-F238E27FC236}">
+                <a16:creationId xmlns:a16="http://schemas.microsoft.com/office/drawing/2014/main" id="{9BB631E3-D6F0-EF24-D17C-0522314FA347}"/>
+              </a:ext>
+            </a:extLst>
+          </p:cNvPr>
+          <p:cNvPicPr>
+            <a:picLocks noGrp="1" noChangeAspect="1"/>
+          </p:cNvPicPr>
+          <p:nvPr>
+            <p:ph type="pic" idx="1"/>
+          </p:nvPr>
+        </p:nvPicPr>
+        <p:blipFill>
+          <a:blip r:embed="rId2">
+            <a:extLst>
+              <a:ext uri="{28A0092B-C50C-407E-A947-70E740481C1C}">
+                <a14:useLocalDpi xmlns:a14="http://schemas.microsoft.com/office/drawing/2010/main" val="0"/>
+              </a:ext>
+            </a:extLst>
+          </a:blip>
+          <a:srcRect t="19050" b="19050"/>
+          <a:stretch>
+            <a:fillRect/>
+          </a:stretch>
+        </p:blipFill>
+        <p:spPr>
+          <a:xfrm>
+            <a:off x="6703641" y="737350"/>
+            <a:ext cx="3346045" cy="1380793"/>
+          </a:xfrm>
+        </p:spPr>
+      </p:pic>
       <p:sp>
         <p:nvSpPr>
           <p:cNvPr id="4" name="Text Placeholder 3">
@@ -7855,7 +7982,7 @@
           <p:nvPr/>
         </p:nvPicPr>
         <p:blipFill>
-          <a:blip r:embed="rId2">
+          <a:blip r:embed="rId3">
             <a:extLst>
               <a:ext uri="{28A0092B-C50C-407E-A947-70E740481C1C}">
                 <a14:useLocalDpi xmlns:a14="http://schemas.microsoft.com/office/drawing/2010/main" val="0"/>
@@ -7891,7 +8018,7 @@
           <p:nvPr/>
         </p:nvPicPr>
         <p:blipFill>
-          <a:blip r:embed="rId3">
+          <a:blip r:embed="rId4">
             <a:extLst>
               <a:ext uri="{28A0092B-C50C-407E-A947-70E740481C1C}">
                 <a14:useLocalDpi xmlns:a14="http://schemas.microsoft.com/office/drawing/2010/main" val="0"/>
@@ -7933,7 +8060,7 @@
           <p:nvPr/>
         </p:nvPicPr>
         <p:blipFill>
-          <a:blip r:embed="rId4">
+          <a:blip r:embed="rId5">
             <a:extLst>
               <a:ext uri="{28A0092B-C50C-407E-A947-70E740481C1C}">
                 <a14:useLocalDpi xmlns:a14="http://schemas.microsoft.com/office/drawing/2010/main" val="0"/>
@@ -7969,7 +8096,7 @@
           <p:nvPr/>
         </p:nvPicPr>
         <p:blipFill>
-          <a:blip r:embed="rId5">
+          <a:blip r:embed="rId6">
             <a:extLst>
               <a:ext uri="{28A0092B-C50C-407E-A947-70E740481C1C}">
                 <a14:useLocalDpi xmlns:a14="http://schemas.microsoft.com/office/drawing/2010/main" val="0"/>
@@ -8005,7 +8132,7 @@
           <p:nvPr/>
         </p:nvPicPr>
         <p:blipFill>
-          <a:blip r:embed="rId6">
+          <a:blip r:embed="rId7">
             <a:extLst>
               <a:ext uri="{28A0092B-C50C-407E-A947-70E740481C1C}">
                 <a14:useLocalDpi xmlns:a14="http://schemas.microsoft.com/office/drawing/2010/main" val="0"/>
@@ -8047,7 +8174,7 @@
           <p:nvPr/>
         </p:nvPicPr>
         <p:blipFill>
-          <a:blip r:embed="rId7">
+          <a:blip r:embed="rId8">
             <a:extLst>
               <a:ext uri="{28A0092B-C50C-407E-A947-70E740481C1C}">
                 <a14:useLocalDpi xmlns:a14="http://schemas.microsoft.com/office/drawing/2010/main" val="0"/>
@@ -8099,7 +8226,7 @@
           <p:nvPr/>
         </p:nvPicPr>
         <p:blipFill>
-          <a:blip r:embed="rId8">
+          <a:blip r:embed="rId9">
             <a:extLst>
               <a:ext uri="{28A0092B-C50C-407E-A947-70E740481C1C}">
                 <a14:useLocalDpi xmlns:a14="http://schemas.microsoft.com/office/drawing/2010/main" val="0"/>
@@ -8135,7 +8262,7 @@
           <p:nvPr/>
         </p:nvPicPr>
         <p:blipFill>
-          <a:blip r:embed="rId9">
+          <a:blip r:embed="rId10">
             <a:extLst>
               <a:ext uri="{28A0092B-C50C-407E-A947-70E740481C1C}">
                 <a14:useLocalDpi xmlns:a14="http://schemas.microsoft.com/office/drawing/2010/main" val="0"/>
@@ -8171,7 +8298,7 @@
           <p:nvPr/>
         </p:nvPicPr>
         <p:blipFill>
-          <a:blip r:embed="rId10">
+          <a:blip r:embed="rId11">
             <a:extLst>
               <a:ext uri="{28A0092B-C50C-407E-A947-70E740481C1C}">
                 <a14:useLocalDpi xmlns:a14="http://schemas.microsoft.com/office/drawing/2010/main" val="0"/>
@@ -8217,7 +8344,7 @@
           <p:nvPr/>
         </p:nvPicPr>
         <p:blipFill>
-          <a:blip r:embed="rId11">
+          <a:blip r:embed="rId12">
             <a:extLst>
               <a:ext uri="{28A0092B-C50C-407E-A947-70E740481C1C}">
                 <a14:useLocalDpi xmlns:a14="http://schemas.microsoft.com/office/drawing/2010/main" val="0"/>
@@ -8277,7 +8404,7 @@
           <p:nvPr/>
         </p:nvPicPr>
         <p:blipFill>
-          <a:blip r:embed="rId12">
+          <a:blip r:embed="rId13">
             <a:extLst>
               <a:ext uri="{28A0092B-C50C-407E-A947-70E740481C1C}">
                 <a14:useLocalDpi xmlns:a14="http://schemas.microsoft.com/office/drawing/2010/main" val="0"/>
@@ -8313,7 +8440,7 @@
           <p:nvPr/>
         </p:nvPicPr>
         <p:blipFill>
-          <a:blip r:embed="rId13">
+          <a:blip r:embed="rId14">
             <a:extLst>
               <a:ext uri="{28A0092B-C50C-407E-A947-70E740481C1C}">
                 <a14:useLocalDpi xmlns:a14="http://schemas.microsoft.com/office/drawing/2010/main" val="0"/>
@@ -8349,7 +8476,7 @@
           <p:nvPr/>
         </p:nvPicPr>
         <p:blipFill>
-          <a:blip r:embed="rId14">
+          <a:blip r:embed="rId15">
             <a:extLst>
               <a:ext uri="{28A0092B-C50C-407E-A947-70E740481C1C}">
                 <a14:useLocalDpi xmlns:a14="http://schemas.microsoft.com/office/drawing/2010/main" val="0"/>
@@ -8379,42 +8506,6 @@
             </a:outerShdw>
             <a:softEdge rad="63500"/>
           </a:effectLst>
-        </p:spPr>
-      </p:pic>
-      <p:pic>
-        <p:nvPicPr>
-          <p:cNvPr id="96" name="Picture Placeholder 95">
-            <a:extLst>
-              <a:ext uri="{FF2B5EF4-FFF2-40B4-BE49-F238E27FC236}">
-                <a16:creationId xmlns:a16="http://schemas.microsoft.com/office/drawing/2014/main" id="{9BB631E3-D6F0-EF24-D17C-0522314FA347}"/>
-              </a:ext>
-            </a:extLst>
-          </p:cNvPr>
-          <p:cNvPicPr>
-            <a:picLocks noGrp="1" noChangeAspect="1"/>
-          </p:cNvPicPr>
-          <p:nvPr>
-            <p:ph type="pic" idx="1"/>
-          </p:nvPr>
-        </p:nvPicPr>
-        <p:blipFill>
-          <a:blip r:embed="rId15">
-            <a:extLst>
-              <a:ext uri="{28A0092B-C50C-407E-A947-70E740481C1C}">
-                <a14:useLocalDpi xmlns:a14="http://schemas.microsoft.com/office/drawing/2010/main" val="0"/>
-              </a:ext>
-            </a:extLst>
-          </a:blip>
-          <a:srcRect t="19050" b="19050"/>
-          <a:stretch>
-            <a:fillRect/>
-          </a:stretch>
-        </p:blipFill>
-        <p:spPr>
-          <a:xfrm>
-            <a:off x="6703641" y="737350"/>
-            <a:ext cx="3346045" cy="1380793"/>
-          </a:xfrm>
         </p:spPr>
       </p:pic>
     </p:spTree>
@@ -8636,7 +8727,7 @@
           <a:p>
             <a:r>
               <a:rPr lang="en-US" dirty="0"/>
-              <a:t>Manage Categories, Features, RSS, etc.</a:t>
+              <a:t>Manage Categories, Features and everything else.</a:t>
             </a:r>
             <a:endParaRPr lang="bg-BG" dirty="0"/>
           </a:p>
@@ -8698,31 +8789,6 @@
               <a:t>Class structure</a:t>
             </a:r>
             <a:endParaRPr lang="bg-BG" dirty="0"/>
-          </a:p>
-        </p:txBody>
-      </p:sp>
-      <p:sp>
-        <p:nvSpPr>
-          <p:cNvPr id="4" name="Text Placeholder 3">
-            <a:extLst>
-              <a:ext uri="{FF2B5EF4-FFF2-40B4-BE49-F238E27FC236}">
-                <a16:creationId xmlns:a16="http://schemas.microsoft.com/office/drawing/2014/main" id="{64775EDA-9F43-81D9-D4BB-CD37AC36CDF2}"/>
-              </a:ext>
-            </a:extLst>
-          </p:cNvPr>
-          <p:cNvSpPr>
-            <a:spLocks noGrp="1"/>
-          </p:cNvSpPr>
-          <p:nvPr>
-            <p:ph type="body" sz="half" idx="2"/>
-          </p:nvPr>
-        </p:nvSpPr>
-        <p:spPr/>
-        <p:txBody>
-          <a:bodyPr/>
-          <a:lstStyle/>
-          <a:p>
-            <a:endParaRPr lang="bg-BG"/>
           </a:p>
         </p:txBody>
       </p:sp>
@@ -9160,19 +9226,17 @@
       </p:sp>
       <p:pic>
         <p:nvPicPr>
-          <p:cNvPr id="6" name="Picture Placeholder 5">
+          <p:cNvPr id="7" name="Picture 6">
             <a:extLst>
               <a:ext uri="{FF2B5EF4-FFF2-40B4-BE49-F238E27FC236}">
-                <a16:creationId xmlns:a16="http://schemas.microsoft.com/office/drawing/2014/main" id="{3096AED6-C9AC-67E3-EEB0-C732484F6061}"/>
+                <a16:creationId xmlns:a16="http://schemas.microsoft.com/office/drawing/2014/main" id="{0DFB601C-AD4D-CEDA-A85D-755050FFE214}"/>
               </a:ext>
             </a:extLst>
           </p:cNvPr>
           <p:cNvPicPr>
-            <a:picLocks noGrp="1" noChangeAspect="1"/>
+            <a:picLocks noChangeAspect="1"/>
           </p:cNvPicPr>
-          <p:nvPr>
-            <p:ph type="pic" idx="1"/>
-          </p:nvPr>
+          <p:nvPr/>
         </p:nvPicPr>
         <p:blipFill>
           <a:blip r:embed="rId2">
@@ -9188,9 +9252,12 @@
         </p:blipFill>
         <p:spPr>
           <a:xfrm>
-            <a:off x="2433250" y="414005"/>
-            <a:ext cx="7000000" cy="6029989"/>
+            <a:off x="2115396" y="0"/>
+            <a:ext cx="7961208" cy="6858000"/>
           </a:xfrm>
+          <a:prstGeom prst="rect">
+            <a:avLst/>
+          </a:prstGeom>
         </p:spPr>
       </p:pic>
     </p:spTree>
@@ -9419,7 +9486,7 @@
 <file path=ppt/theme/theme1.xml><?xml version="1.0" encoding="utf-8"?>
 <a:theme xmlns:a="http://schemas.openxmlformats.org/drawingml/2006/main" name="Ion">
   <a:themeElements>
-    <a:clrScheme name="Ion">
+    <a:clrScheme name="Yellow">
       <a:dk1>
         <a:sysClr val="windowText" lastClr="000000"/>
       </a:dk1>
@@ -9427,83 +9494,48 @@
         <a:sysClr val="window" lastClr="FFFFFF"/>
       </a:lt1>
       <a:dk2>
-        <a:srgbClr val="3B3059"/>
+        <a:srgbClr val="39302A"/>
       </a:dk2>
       <a:lt2>
-        <a:srgbClr val="EBEBEB"/>
+        <a:srgbClr val="E5DEDB"/>
       </a:lt2>
       <a:accent1>
-        <a:srgbClr val="B31166"/>
+        <a:srgbClr val="FFCA08"/>
       </a:accent1>
       <a:accent2>
-        <a:srgbClr val="E33D6F"/>
+        <a:srgbClr val="F8931D"/>
       </a:accent2>
       <a:accent3>
-        <a:srgbClr val="E45F3C"/>
+        <a:srgbClr val="CE8D3E"/>
       </a:accent3>
       <a:accent4>
-        <a:srgbClr val="E9943A"/>
+        <a:srgbClr val="EC7016"/>
       </a:accent4>
       <a:accent5>
-        <a:srgbClr val="9B6BF2"/>
+        <a:srgbClr val="E64823"/>
       </a:accent5>
       <a:accent6>
-        <a:srgbClr val="D53DD0"/>
+        <a:srgbClr val="9C6A6A"/>
       </a:accent6>
       <a:hlink>
-        <a:srgbClr val="EC76B5"/>
+        <a:srgbClr val="2998E3"/>
       </a:hlink>
       <a:folHlink>
-        <a:srgbClr val="E8ACCD"/>
+        <a:srgbClr val="7F723D"/>
       </a:folHlink>
     </a:clrScheme>
-    <a:fontScheme name="Ion">
+    <a:fontScheme name="Franklin Gothic">
       <a:majorFont>
-        <a:latin typeface="Century Gothic" panose="020B0502020202020204"/>
+        <a:latin typeface="Franklin Gothic Medium" panose="020B0603020102020204"/>
         <a:ea typeface=""/>
         <a:cs typeface=""/>
-        <a:font script="Jpan" typeface="メイリオ"/>
-        <a:font script="Hang" typeface="맑은 고딕"/>
-        <a:font script="Hans" typeface="宋体"/>
-        <a:font script="Hant" typeface="新細明體"/>
-        <a:font script="Arab" typeface="Times New Roman"/>
-        <a:font script="Hebr" typeface="Times New Roman"/>
-        <a:font script="Thai" typeface="Angsana New"/>
-        <a:font script="Ethi" typeface="Nyala"/>
-        <a:font script="Beng" typeface="Vrinda"/>
-        <a:font script="Gujr" typeface="Shruti"/>
-        <a:font script="Khmr" typeface="MoolBoran"/>
-        <a:font script="Knda" typeface="Tunga"/>
-        <a:font script="Guru" typeface="Raavi"/>
-        <a:font script="Cans" typeface="Euphemia"/>
-        <a:font script="Cher" typeface="Plantagenet Cherokee"/>
-        <a:font script="Yiii" typeface="Microsoft Yi Baiti"/>
-        <a:font script="Tibt" typeface="Microsoft Himalaya"/>
-        <a:font script="Thaa" typeface="MV Boli"/>
-        <a:font script="Deva" typeface="Mangal"/>
-        <a:font script="Telu" typeface="Gautami"/>
-        <a:font script="Taml" typeface="Latha"/>
-        <a:font script="Syrc" typeface="Estrangelo Edessa"/>
-        <a:font script="Orya" typeface="Kalinga"/>
-        <a:font script="Mlym" typeface="Kartika"/>
-        <a:font script="Laoo" typeface="DokChampa"/>
-        <a:font script="Sinh" typeface="Iskoola Pota"/>
-        <a:font script="Mong" typeface="Mongolian Baiti"/>
-        <a:font script="Viet" typeface="Times New Roman"/>
-        <a:font script="Uigh" typeface="Microsoft Uighur"/>
-        <a:font script="Geor" typeface="Sylfaen"/>
-      </a:majorFont>
-      <a:minorFont>
-        <a:latin typeface="Century Gothic" panose="020B0502020202020204"/>
-        <a:ea typeface=""/>
-        <a:cs typeface=""/>
-        <a:font script="Jpan" typeface="メイリオ"/>
-        <a:font script="Hang" typeface="맑은 고딕"/>
-        <a:font script="Hans" typeface="宋体"/>
-        <a:font script="Hant" typeface="新細明體"/>
-        <a:font script="Arab" typeface="Arial"/>
-        <a:font script="Hebr" typeface="Arial"/>
-        <a:font script="Thai" typeface="Cordia New"/>
+        <a:font script="Jpan" typeface="HG創英角ｺﾞｼｯｸUB"/>
+        <a:font script="Hang" typeface="돋움"/>
+        <a:font script="Hans" typeface="隶书"/>
+        <a:font script="Hant" typeface="微軟正黑體"/>
+        <a:font script="Arab" typeface="Tahoma"/>
+        <a:font script="Hebr" typeface="Aharoni"/>
+        <a:font script="Thai" typeface="LilyUPC"/>
         <a:font script="Ethi" typeface="Nyala"/>
         <a:font script="Beng" typeface="Vrinda"/>
         <a:font script="Gujr" typeface="Shruti"/>
@@ -9525,6 +9557,41 @@
         <a:font script="Sinh" typeface="Iskoola Pota"/>
         <a:font script="Mong" typeface="Mongolian Baiti"/>
         <a:font script="Viet" typeface="Arial"/>
+        <a:font script="Uigh" typeface="Microsoft Uighur"/>
+        <a:font script="Geor" typeface="Sylfaen"/>
+      </a:majorFont>
+      <a:minorFont>
+        <a:latin typeface="Franklin Gothic Book" panose="020B0503020102020204"/>
+        <a:ea typeface=""/>
+        <a:cs typeface=""/>
+        <a:font script="Jpan" typeface="HGｺﾞｼｯｸE"/>
+        <a:font script="Hang" typeface="돋움"/>
+        <a:font script="Hans" typeface="华文楷体"/>
+        <a:font script="Hant" typeface="微軟正黑體"/>
+        <a:font script="Arab" typeface="Tahoma"/>
+        <a:font script="Hebr" typeface="Aharoni"/>
+        <a:font script="Thai" typeface="LilyUPC"/>
+        <a:font script="Ethi" typeface="Nyala"/>
+        <a:font script="Beng" typeface="Vrinda"/>
+        <a:font script="Gujr" typeface="Shruti"/>
+        <a:font script="Khmr" typeface="DaunPenh"/>
+        <a:font script="Knda" typeface="Tunga"/>
+        <a:font script="Guru" typeface="Raavi"/>
+        <a:font script="Cans" typeface="Euphemia"/>
+        <a:font script="Cher" typeface="Plantagenet Cherokee"/>
+        <a:font script="Yiii" typeface="Microsoft Yi Baiti"/>
+        <a:font script="Tibt" typeface="Microsoft Himalaya"/>
+        <a:font script="Thaa" typeface="MV Boli"/>
+        <a:font script="Deva" typeface="Mangal"/>
+        <a:font script="Telu" typeface="Gautami"/>
+        <a:font script="Taml" typeface="Latha"/>
+        <a:font script="Syrc" typeface="Estrangelo Edessa"/>
+        <a:font script="Orya" typeface="Kalinga"/>
+        <a:font script="Mlym" typeface="Kartika"/>
+        <a:font script="Laoo" typeface="DokChampa"/>
+        <a:font script="Sinh" typeface="Iskoola Pota"/>
+        <a:font script="Mong" typeface="Mongolian Baiti"/>
+        <a:font script="Viet" typeface="Tahoma"/>
         <a:font script="Uigh" typeface="Microsoft Uighur"/>
         <a:font script="Geor" typeface="Sylfaen"/>
       </a:minorFont>

</xml_diff>

<commit_message>
Updated the PowerPoint presentation and the ERdiagram.png. Tabulation changes to DB contents.txt
</commit_message>
<xml_diff>
--- a/eMAG.pptx
+++ b/eMAG.pptx
@@ -320,7 +320,7 @@
           <a:p>
             <a:fld id="{9788AE7C-F21C-4D79-9554-45BAAB68CF94}" type="datetimeFigureOut">
               <a:rPr lang="bg-BG" smtClean="0"/>
-              <a:t>31.10.2022 г.</a:t>
+              <a:t>1.11.2022 г.</a:t>
             </a:fld>
             <a:endParaRPr lang="bg-BG"/>
           </a:p>
@@ -595,7 +595,7 @@
           <a:p>
             <a:fld id="{9788AE7C-F21C-4D79-9554-45BAAB68CF94}" type="datetimeFigureOut">
               <a:rPr lang="bg-BG" smtClean="0"/>
-              <a:t>31.10.2022 г.</a:t>
+              <a:t>1.11.2022 г.</a:t>
             </a:fld>
             <a:endParaRPr lang="bg-BG"/>
           </a:p>
@@ -789,7 +789,7 @@
           <a:p>
             <a:fld id="{9788AE7C-F21C-4D79-9554-45BAAB68CF94}" type="datetimeFigureOut">
               <a:rPr lang="bg-BG" smtClean="0"/>
-              <a:t>31.10.2022 г.</a:t>
+              <a:t>1.11.2022 г.</a:t>
             </a:fld>
             <a:endParaRPr lang="bg-BG"/>
           </a:p>
@@ -1060,7 +1060,7 @@
           <a:p>
             <a:fld id="{9788AE7C-F21C-4D79-9554-45BAAB68CF94}" type="datetimeFigureOut">
               <a:rPr lang="bg-BG" smtClean="0"/>
-              <a:t>31.10.2022 г.</a:t>
+              <a:t>1.11.2022 г.</a:t>
             </a:fld>
             <a:endParaRPr lang="bg-BG"/>
           </a:p>
@@ -1387,7 +1387,7 @@
           <a:p>
             <a:fld id="{9788AE7C-F21C-4D79-9554-45BAAB68CF94}" type="datetimeFigureOut">
               <a:rPr lang="bg-BG" smtClean="0"/>
-              <a:t>31.10.2022 г.</a:t>
+              <a:t>1.11.2022 г.</a:t>
             </a:fld>
             <a:endParaRPr lang="bg-BG"/>
           </a:p>
@@ -2006,7 +2006,7 @@
           <a:p>
             <a:fld id="{9788AE7C-F21C-4D79-9554-45BAAB68CF94}" type="datetimeFigureOut">
               <a:rPr lang="bg-BG" smtClean="0"/>
-              <a:t>31.10.2022 г.</a:t>
+              <a:t>1.11.2022 г.</a:t>
             </a:fld>
             <a:endParaRPr lang="bg-BG"/>
           </a:p>
@@ -2853,7 +2853,7 @@
           <a:p>
             <a:fld id="{9788AE7C-F21C-4D79-9554-45BAAB68CF94}" type="datetimeFigureOut">
               <a:rPr lang="bg-BG" smtClean="0"/>
-              <a:t>31.10.2022 г.</a:t>
+              <a:t>1.11.2022 г.</a:t>
             </a:fld>
             <a:endParaRPr lang="bg-BG"/>
           </a:p>
@@ -3023,7 +3023,7 @@
           <a:p>
             <a:fld id="{9788AE7C-F21C-4D79-9554-45BAAB68CF94}" type="datetimeFigureOut">
               <a:rPr lang="bg-BG" smtClean="0"/>
-              <a:t>31.10.2022 г.</a:t>
+              <a:t>1.11.2022 г.</a:t>
             </a:fld>
             <a:endParaRPr lang="bg-BG"/>
           </a:p>
@@ -3203,7 +3203,7 @@
           <a:p>
             <a:fld id="{9788AE7C-F21C-4D79-9554-45BAAB68CF94}" type="datetimeFigureOut">
               <a:rPr lang="bg-BG" smtClean="0"/>
-              <a:t>31.10.2022 г.</a:t>
+              <a:t>1.11.2022 г.</a:t>
             </a:fld>
             <a:endParaRPr lang="bg-BG"/>
           </a:p>
@@ -3373,7 +3373,7 @@
           <a:p>
             <a:fld id="{9788AE7C-F21C-4D79-9554-45BAAB68CF94}" type="datetimeFigureOut">
               <a:rPr lang="bg-BG" smtClean="0"/>
-              <a:t>31.10.2022 г.</a:t>
+              <a:t>1.11.2022 г.</a:t>
             </a:fld>
             <a:endParaRPr lang="bg-BG"/>
           </a:p>
@@ -3620,7 +3620,7 @@
           <a:p>
             <a:fld id="{9788AE7C-F21C-4D79-9554-45BAAB68CF94}" type="datetimeFigureOut">
               <a:rPr lang="bg-BG" smtClean="0"/>
-              <a:t>31.10.2022 г.</a:t>
+              <a:t>1.11.2022 г.</a:t>
             </a:fld>
             <a:endParaRPr lang="bg-BG"/>
           </a:p>
@@ -3912,7 +3912,7 @@
           <a:p>
             <a:fld id="{9788AE7C-F21C-4D79-9554-45BAAB68CF94}" type="datetimeFigureOut">
               <a:rPr lang="bg-BG" smtClean="0"/>
-              <a:t>31.10.2022 г.</a:t>
+              <a:t>1.11.2022 г.</a:t>
             </a:fld>
             <a:endParaRPr lang="bg-BG"/>
           </a:p>
@@ -4356,7 +4356,7 @@
           <a:p>
             <a:fld id="{9788AE7C-F21C-4D79-9554-45BAAB68CF94}" type="datetimeFigureOut">
               <a:rPr lang="bg-BG" smtClean="0"/>
-              <a:t>31.10.2022 г.</a:t>
+              <a:t>1.11.2022 г.</a:t>
             </a:fld>
             <a:endParaRPr lang="bg-BG"/>
           </a:p>
@@ -4474,7 +4474,7 @@
           <a:p>
             <a:fld id="{9788AE7C-F21C-4D79-9554-45BAAB68CF94}" type="datetimeFigureOut">
               <a:rPr lang="bg-BG" smtClean="0"/>
-              <a:t>31.10.2022 г.</a:t>
+              <a:t>1.11.2022 г.</a:t>
             </a:fld>
             <a:endParaRPr lang="bg-BG"/>
           </a:p>
@@ -4569,7 +4569,7 @@
           <a:p>
             <a:fld id="{9788AE7C-F21C-4D79-9554-45BAAB68CF94}" type="datetimeFigureOut">
               <a:rPr lang="bg-BG" smtClean="0"/>
-              <a:t>31.10.2022 г.</a:t>
+              <a:t>1.11.2022 г.</a:t>
             </a:fld>
             <a:endParaRPr lang="bg-BG"/>
           </a:p>
@@ -4848,7 +4848,7 @@
           <a:p>
             <a:fld id="{9788AE7C-F21C-4D79-9554-45BAAB68CF94}" type="datetimeFigureOut">
               <a:rPr lang="bg-BG" smtClean="0"/>
-              <a:t>31.10.2022 г.</a:t>
+              <a:t>1.11.2022 г.</a:t>
             </a:fld>
             <a:endParaRPr lang="bg-BG"/>
           </a:p>
@@ -5123,7 +5123,7 @@
           <a:p>
             <a:fld id="{9788AE7C-F21C-4D79-9554-45BAAB68CF94}" type="datetimeFigureOut">
               <a:rPr lang="bg-BG" smtClean="0"/>
-              <a:t>31.10.2022 г.</a:t>
+              <a:t>1.11.2022 г.</a:t>
             </a:fld>
             <a:endParaRPr lang="bg-BG"/>
           </a:p>
@@ -5546,7 +5546,7 @@
           <a:p>
             <a:fld id="{9788AE7C-F21C-4D79-9554-45BAAB68CF94}" type="datetimeFigureOut">
               <a:rPr lang="bg-BG" smtClean="0"/>
-              <a:t>31.10.2022 г.</a:t>
+              <a:t>1.11.2022 г.</a:t>
             </a:fld>
             <a:endParaRPr lang="bg-BG"/>
           </a:p>
@@ -6220,15 +6220,11 @@
           <a:p>
             <a:pPr algn="r"/>
             <a:r>
-              <a:rPr lang="en-US" sz="1100" dirty="0">
-                <a:solidFill>
-                  <a:schemeClr val="tx1"/>
-                </a:solidFill>
-              </a:rPr>
-              <a:t>A final assignment in</a:t>
-            </a:r>
-            <a:r>
-              <a:rPr lang="en-US" sz="1400" dirty="0">
+              <a:rPr lang="en-US" sz="1100" cap="none" dirty="0"/>
+              <a:t>A final assignment for</a:t>
+            </a:r>
+            <a:r>
+              <a:rPr lang="en-US" sz="1400" cap="none" dirty="0">
                 <a:solidFill>
                   <a:schemeClr val="tx1"/>
                 </a:solidFill>
@@ -6236,7 +6232,7 @@
               <a:t> </a:t>
             </a:r>
             <a:r>
-              <a:rPr lang="en-US" sz="1400" dirty="0" err="1">
+              <a:rPr lang="en-US" sz="1400" cap="none" dirty="0" err="1">
                 <a:solidFill>
                   <a:schemeClr val="tx1"/>
                 </a:solidFill>
@@ -6244,7 +6240,7 @@
               <a:t>ItTalents</a:t>
             </a:r>
             <a:r>
-              <a:rPr lang="en-US" sz="1400" dirty="0">
+              <a:rPr lang="en-US" sz="1400" cap="none" dirty="0">
                 <a:solidFill>
                   <a:schemeClr val="tx1"/>
                 </a:solidFill>
@@ -6252,15 +6248,19 @@
               <a:t> Season_14 </a:t>
             </a:r>
             <a:r>
-              <a:rPr lang="en-US" sz="1100" dirty="0">
+              <a:rPr lang="en-US" sz="1100" cap="none" dirty="0"/>
+              <a:t>tutored by</a:t>
+            </a:r>
+            <a:r>
+              <a:rPr lang="en-US" sz="1100" cap="none" dirty="0">
                 <a:solidFill>
                   <a:schemeClr val="tx1"/>
                 </a:solidFill>
               </a:rPr>
-              <a:t>tutored by </a:t>
-            </a:r>
-            <a:r>
-              <a:rPr lang="en-US" sz="1400" dirty="0" err="1">
+              <a:t> </a:t>
+            </a:r>
+            <a:r>
+              <a:rPr lang="en-US" sz="1400" cap="none" dirty="0" err="1">
                 <a:solidFill>
                   <a:schemeClr val="tx1"/>
                 </a:solidFill>
@@ -6268,7 +6268,7 @@
               <a:t>Krasimir</a:t>
             </a:r>
             <a:r>
-              <a:rPr lang="en-US" sz="1400" dirty="0">
+              <a:rPr lang="en-US" sz="1400" cap="none" dirty="0">
                 <a:solidFill>
                   <a:schemeClr val="tx1"/>
                 </a:solidFill>
@@ -6276,14 +6276,14 @@
               <a:t> </a:t>
             </a:r>
             <a:r>
-              <a:rPr lang="en-US" sz="1400" dirty="0" err="1">
+              <a:rPr lang="en-US" sz="1400" cap="none" dirty="0" err="1">
                 <a:solidFill>
                   <a:schemeClr val="tx1"/>
                 </a:solidFill>
               </a:rPr>
               <a:t>Stoev</a:t>
             </a:r>
-            <a:endParaRPr lang="bg-BG" sz="1400" dirty="0">
+            <a:endParaRPr lang="bg-BG" sz="1400" cap="none" dirty="0">
               <a:solidFill>
                 <a:schemeClr val="tx1"/>
               </a:solidFill>
@@ -9226,10 +9226,10 @@
       </p:sp>
       <p:pic>
         <p:nvPicPr>
-          <p:cNvPr id="7" name="Picture 6">
+          <p:cNvPr id="4" name="Picture 3">
             <a:extLst>
               <a:ext uri="{FF2B5EF4-FFF2-40B4-BE49-F238E27FC236}">
-                <a16:creationId xmlns:a16="http://schemas.microsoft.com/office/drawing/2014/main" id="{0DFB601C-AD4D-CEDA-A85D-755050FFE214}"/>
+                <a16:creationId xmlns:a16="http://schemas.microsoft.com/office/drawing/2014/main" id="{E9B30854-7FC5-78F4-7BB0-309FD2392168}"/>
               </a:ext>
             </a:extLst>
           </p:cNvPr>
@@ -9252,8 +9252,8 @@
         </p:blipFill>
         <p:spPr>
           <a:xfrm>
-            <a:off x="2115396" y="0"/>
-            <a:ext cx="7961208" cy="6858000"/>
+            <a:off x="2027326" y="0"/>
+            <a:ext cx="8137348" cy="6858000"/>
           </a:xfrm>
           <a:prstGeom prst="rect">
             <a:avLst/>

</xml_diff>